<commit_message>
Round out the compliance deck
Signed-off-by: Nathen Harvey <nharvey@chef.io>
</commit_message>
<xml_diff>
--- a/powerpoint/Continuous-Compliance.pptx
+++ b/powerpoint/Continuous-Compliance.pptx
@@ -7,10 +7,10 @@
     <p:sldMasterId id="2147483960" r:id="rId3"/>
   </p:sldMasterIdLst>
   <p:notesMasterIdLst>
-    <p:notesMasterId r:id="rId28"/>
+    <p:notesMasterId r:id="rId40"/>
   </p:notesMasterIdLst>
   <p:handoutMasterIdLst>
-    <p:handoutMasterId r:id="rId29"/>
+    <p:handoutMasterId r:id="rId41"/>
   </p:handoutMasterIdLst>
   <p:sldIdLst>
     <p:sldId id="256" r:id="rId4"/>
@@ -37,6 +37,18 @@
     <p:sldId id="280" r:id="rId25"/>
     <p:sldId id="281" r:id="rId26"/>
     <p:sldId id="282" r:id="rId27"/>
+    <p:sldId id="283" r:id="rId28"/>
+    <p:sldId id="284" r:id="rId29"/>
+    <p:sldId id="285" r:id="rId30"/>
+    <p:sldId id="289" r:id="rId31"/>
+    <p:sldId id="290" r:id="rId32"/>
+    <p:sldId id="291" r:id="rId33"/>
+    <p:sldId id="292" r:id="rId34"/>
+    <p:sldId id="293" r:id="rId35"/>
+    <p:sldId id="294" r:id="rId36"/>
+    <p:sldId id="295" r:id="rId37"/>
+    <p:sldId id="296" r:id="rId38"/>
+    <p:sldId id="297" r:id="rId39"/>
   </p:sldIdLst>
   <p:sldSz cx="14630400" cy="8229600"/>
   <p:notesSz cx="6858000" cy="9144000"/>
@@ -164,12 +176,24 @@
             <p14:sldId id="280"/>
             <p14:sldId id="281"/>
             <p14:sldId id="282"/>
+            <p14:sldId id="283"/>
+            <p14:sldId id="284"/>
+            <p14:sldId id="285"/>
+            <p14:sldId id="289"/>
+            <p14:sldId id="290"/>
+            <p14:sldId id="291"/>
+            <p14:sldId id="292"/>
+            <p14:sldId id="293"/>
+            <p14:sldId id="294"/>
+            <p14:sldId id="295"/>
+            <p14:sldId id="296"/>
+            <p14:sldId id="297"/>
           </p14:sldIdLst>
         </p14:section>
       </p14:sectionLst>
     </p:ext>
     <p:ext uri="{EFAFB233-063F-42B5-8137-9DF3F51BA10A}">
-      <p15:sldGuideLst xmlns:p15="http://schemas.microsoft.com/office/powerpoint/2012/main" xmlns="">
+      <p15:sldGuideLst xmlns="" xmlns:p15="http://schemas.microsoft.com/office/powerpoint/2012/main">
         <p15:guide id="1" orient="horz" pos="2856" userDrawn="1">
           <p15:clr>
             <a:srgbClr val="A4A3A4"/>
@@ -944,6 +968,94 @@
 </p:notes>
 </file>
 
+<file path=ppt/notesSlides/notesSlide11.xml><?xml version="1.0" encoding="utf-8"?>
+<p:notes xmlns:a="http://schemas.openxmlformats.org/drawingml/2006/main" xmlns:r="http://schemas.openxmlformats.org/officeDocument/2006/relationships" xmlns:p="http://schemas.openxmlformats.org/presentationml/2006/main">
+  <p:cSld>
+    <p:spTree>
+      <p:nvGrpSpPr>
+        <p:cNvPr id="1" name=""/>
+        <p:cNvGrpSpPr/>
+        <p:nvPr/>
+      </p:nvGrpSpPr>
+      <p:grpSpPr>
+        <a:xfrm>
+          <a:off x="0" y="0"/>
+          <a:ext cx="0" cy="0"/>
+          <a:chOff x="0" y="0"/>
+          <a:chExt cx="0" cy="0"/>
+        </a:xfrm>
+      </p:grpSpPr>
+      <p:sp>
+        <p:nvSpPr>
+          <p:cNvPr id="2" name="Slide Image Placeholder 1"/>
+          <p:cNvSpPr>
+            <a:spLocks noGrp="1" noRot="1" noChangeAspect="1"/>
+          </p:cNvSpPr>
+          <p:nvPr>
+            <p:ph type="sldImg"/>
+          </p:nvPr>
+        </p:nvSpPr>
+        <p:spPr/>
+      </p:sp>
+      <p:sp>
+        <p:nvSpPr>
+          <p:cNvPr id="3" name="Notes Placeholder 2"/>
+          <p:cNvSpPr>
+            <a:spLocks noGrp="1"/>
+          </p:cNvSpPr>
+          <p:nvPr>
+            <p:ph type="body" idx="1"/>
+          </p:nvPr>
+        </p:nvSpPr>
+        <p:spPr/>
+        <p:txBody>
+          <a:bodyPr/>
+          <a:lstStyle/>
+          <a:p>
+            <a:r>
+              <a:rPr lang="en-US" dirty="0" smtClean="0"/>
+              <a:t>Depending on time and experience with Chef you can do either thing next</a:t>
+            </a:r>
+            <a:endParaRPr lang="en-US" dirty="0"/>
+          </a:p>
+        </p:txBody>
+      </p:sp>
+      <p:sp>
+        <p:nvSpPr>
+          <p:cNvPr id="4" name="Slide Number Placeholder 3"/>
+          <p:cNvSpPr>
+            <a:spLocks noGrp="1"/>
+          </p:cNvSpPr>
+          <p:nvPr>
+            <p:ph type="sldNum" sz="quarter" idx="10"/>
+          </p:nvPr>
+        </p:nvSpPr>
+        <p:spPr/>
+        <p:txBody>
+          <a:bodyPr/>
+          <a:lstStyle/>
+          <a:p>
+            <a:fld id="{8B29331E-A40C-8E45-90AE-4B94C2016DA4}" type="slidenum">
+              <a:rPr lang="en-US" smtClean="0"/>
+              <a:t>32</a:t>
+            </a:fld>
+            <a:endParaRPr lang="en-US"/>
+          </a:p>
+        </p:txBody>
+      </p:sp>
+    </p:spTree>
+    <p:extLst>
+      <p:ext uri="{BB962C8B-B14F-4D97-AF65-F5344CB8AC3E}">
+        <p14:creationId xmlns:p14="http://schemas.microsoft.com/office/powerpoint/2010/main" val="119724306"/>
+      </p:ext>
+    </p:extLst>
+  </p:cSld>
+  <p:clrMapOvr>
+    <a:masterClrMapping/>
+  </p:clrMapOvr>
+</p:notes>
+</file>
+
 <file path=ppt/notesSlides/notesSlide2.xml><?xml version="1.0" encoding="utf-8"?>
 <p:notes xmlns:a="http://schemas.openxmlformats.org/drawingml/2006/main" xmlns:r="http://schemas.openxmlformats.org/officeDocument/2006/relationships" xmlns:p="http://schemas.openxmlformats.org/presentationml/2006/main">
   <p:cSld>
@@ -5653,13 +5765,8 @@
             <a:pPr lvl="0"/>
             <a:r>
               <a:rPr lang="en-US" dirty="0" smtClean="0"/>
-              <a:t>Click to edit Master text </a:t>
-            </a:r>
-            <a:r>
-              <a:rPr lang="en-US" dirty="0" smtClean="0"/>
-              <a:t>styles</a:t>
-            </a:r>
-            <a:endParaRPr lang="en-US" dirty="0" smtClean="0"/>
+              <a:t>Click to edit Master text styles</a:t>
+            </a:r>
           </a:p>
         </p:txBody>
       </p:sp>
@@ -7162,7 +7269,7 @@
 
 <file path=ppt/slideLayouts/slideLayout35.xml><?xml version="1.0" encoding="utf-8"?>
 <p:sldLayout xmlns:a="http://schemas.openxmlformats.org/drawingml/2006/main" xmlns:r="http://schemas.openxmlformats.org/officeDocument/2006/relationships" xmlns:p="http://schemas.openxmlformats.org/presentationml/2006/main" preserve="1" userDrawn="1">
-  <p:cSld name="Title Only">
+  <p:cSld name="Shell Command">
     <p:spTree>
       <p:nvGrpSpPr>
         <p:cNvPr id="1" name=""/>
@@ -9688,7 +9795,7 @@
   </p:txStyles>
   <p:extLst mod="1">
     <p:ext uri="{27BBF7A9-308A-43DC-89C8-2F10F3537804}">
-      <p15:sldGuideLst xmlns:p15="http://schemas.microsoft.com/office/powerpoint/2012/main" xmlns=""/>
+      <p15:sldGuideLst xmlns="" xmlns:p15="http://schemas.microsoft.com/office/powerpoint/2012/main"/>
     </p:ext>
   </p:extLst>
 </p:sldMaster>
@@ -10172,7 +10279,7 @@
   </p:txStyles>
   <p:extLst mod="1">
     <p:ext uri="{27BBF7A9-308A-43DC-89C8-2F10F3537804}">
-      <p15:sldGuideLst xmlns:p15="http://schemas.microsoft.com/office/powerpoint/2012/main" xmlns=""/>
+      <p15:sldGuideLst xmlns="" xmlns:p15="http://schemas.microsoft.com/office/powerpoint/2012/main"/>
     </p:ext>
   </p:extLst>
 </p:sldMaster>
@@ -10657,7 +10764,7 @@
   </p:txStyles>
   <p:extLst mod="1">
     <p:ext uri="{27BBF7A9-308A-43DC-89C8-2F10F3537804}">
-      <p15:sldGuideLst xmlns:p15="http://schemas.microsoft.com/office/powerpoint/2012/main" xmlns=""/>
+      <p15:sldGuideLst xmlns="" xmlns:p15="http://schemas.microsoft.com/office/powerpoint/2012/main"/>
     </p:ext>
   </p:extLst>
 </p:sldMaster>
@@ -12796,6 +12903,754 @@
       </p:transition>
     </mc:Fallback>
   </mc:AlternateContent>
+  <p:timing>
+    <p:tnLst>
+      <p:par>
+        <p:cTn xmlns:p14="http://schemas.microsoft.com/office/powerpoint/2010/main" id="1" dur="indefinite" restart="never" nodeType="tmRoot"/>
+      </p:par>
+    </p:tnLst>
+  </p:timing>
+</p:sld>
+</file>
+
+<file path=ppt/slides/slide25.xml><?xml version="1.0" encoding="utf-8"?>
+<p:sld xmlns:a="http://schemas.openxmlformats.org/drawingml/2006/main" xmlns:r="http://schemas.openxmlformats.org/officeDocument/2006/relationships" xmlns:p="http://schemas.openxmlformats.org/presentationml/2006/main">
+  <p:cSld>
+    <p:spTree>
+      <p:nvGrpSpPr>
+        <p:cNvPr id="1" name=""/>
+        <p:cNvGrpSpPr/>
+        <p:nvPr/>
+      </p:nvGrpSpPr>
+      <p:grpSpPr>
+        <a:xfrm>
+          <a:off x="0" y="0"/>
+          <a:ext cx="0" cy="0"/>
+          <a:chOff x="0" y="0"/>
+          <a:chExt cx="0" cy="0"/>
+        </a:xfrm>
+      </p:grpSpPr>
+      <p:sp>
+        <p:nvSpPr>
+          <p:cNvPr id="2" name="Title 1"/>
+          <p:cNvSpPr>
+            <a:spLocks noGrp="1"/>
+          </p:cNvSpPr>
+          <p:nvPr>
+            <p:ph type="title"/>
+          </p:nvPr>
+        </p:nvSpPr>
+        <p:spPr/>
+        <p:txBody>
+          <a:bodyPr/>
+          <a:lstStyle/>
+          <a:p>
+            <a:r>
+              <a:rPr lang="en-US" dirty="0" smtClean="0"/>
+              <a:t>Go home</a:t>
+            </a:r>
+            <a:endParaRPr lang="en-US" dirty="0"/>
+          </a:p>
+        </p:txBody>
+      </p:sp>
+      <p:sp>
+        <p:nvSpPr>
+          <p:cNvPr id="3" name="Content Placeholder 2"/>
+          <p:cNvSpPr>
+            <a:spLocks noGrp="1"/>
+          </p:cNvSpPr>
+          <p:nvPr>
+            <p:ph sz="quarter" idx="11"/>
+          </p:nvPr>
+        </p:nvSpPr>
+        <p:spPr/>
+        <p:txBody>
+          <a:bodyPr/>
+          <a:lstStyle/>
+          <a:p>
+            <a:endParaRPr lang="en-US"/>
+          </a:p>
+        </p:txBody>
+      </p:sp>
+      <p:sp>
+        <p:nvSpPr>
+          <p:cNvPr id="4" name="Text Placeholder 3"/>
+          <p:cNvSpPr>
+            <a:spLocks noGrp="1"/>
+          </p:cNvSpPr>
+          <p:nvPr>
+            <p:ph type="body" sz="quarter" idx="12"/>
+          </p:nvPr>
+        </p:nvSpPr>
+        <p:spPr/>
+        <p:txBody>
+          <a:bodyPr/>
+          <a:lstStyle/>
+          <a:p>
+            <a:r>
+              <a:rPr lang="en-US" dirty="0" smtClean="0"/>
+              <a:t>cd ~</a:t>
+            </a:r>
+            <a:endParaRPr lang="en-US" dirty="0"/>
+          </a:p>
+        </p:txBody>
+      </p:sp>
+    </p:spTree>
+    <p:extLst>
+      <p:ext uri="{BB962C8B-B14F-4D97-AF65-F5344CB8AC3E}">
+        <p14:creationId xmlns:p14="http://schemas.microsoft.com/office/powerpoint/2010/main" val="940361013"/>
+      </p:ext>
+    </p:extLst>
+  </p:cSld>
+  <p:clrMapOvr>
+    <a:masterClrMapping/>
+  </p:clrMapOvr>
+  <mc:AlternateContent xmlns:mc="http://schemas.openxmlformats.org/markup-compatibility/2006" xmlns:p14="http://schemas.microsoft.com/office/powerpoint/2010/main">
+    <mc:Choice Requires="p14">
+      <p:transition spd="med" p14:dur="700">
+        <p:fade/>
+      </p:transition>
+    </mc:Choice>
+    <mc:Fallback xmlns="">
+      <p:transition spd="med">
+        <p:fade/>
+      </p:transition>
+    </mc:Fallback>
+  </mc:AlternateContent>
+  <p:timing>
+    <p:tnLst>
+      <p:par>
+        <p:cTn xmlns:p14="http://schemas.microsoft.com/office/powerpoint/2010/main" id="1" dur="indefinite" restart="never" nodeType="tmRoot"/>
+      </p:par>
+    </p:tnLst>
+  </p:timing>
+</p:sld>
+</file>
+
+<file path=ppt/slides/slide26.xml><?xml version="1.0" encoding="utf-8"?>
+<p:sld xmlns:a="http://schemas.openxmlformats.org/drawingml/2006/main" xmlns:r="http://schemas.openxmlformats.org/officeDocument/2006/relationships" xmlns:p="http://schemas.openxmlformats.org/presentationml/2006/main">
+  <p:cSld>
+    <p:spTree>
+      <p:nvGrpSpPr>
+        <p:cNvPr id="1" name=""/>
+        <p:cNvGrpSpPr/>
+        <p:nvPr/>
+      </p:nvGrpSpPr>
+      <p:grpSpPr>
+        <a:xfrm>
+          <a:off x="0" y="0"/>
+          <a:ext cx="0" cy="0"/>
+          <a:chOff x="0" y="0"/>
+          <a:chExt cx="0" cy="0"/>
+        </a:xfrm>
+      </p:grpSpPr>
+      <p:sp>
+        <p:nvSpPr>
+          <p:cNvPr id="2" name="Title 1"/>
+          <p:cNvSpPr>
+            <a:spLocks noGrp="1"/>
+          </p:cNvSpPr>
+          <p:nvPr>
+            <p:ph type="title"/>
+          </p:nvPr>
+        </p:nvSpPr>
+        <p:spPr/>
+        <p:txBody>
+          <a:bodyPr/>
+          <a:lstStyle/>
+          <a:p>
+            <a:r>
+              <a:rPr lang="en-US" dirty="0" smtClean="0"/>
+              <a:t>List contents</a:t>
+            </a:r>
+            <a:endParaRPr lang="en-US" dirty="0"/>
+          </a:p>
+        </p:txBody>
+      </p:sp>
+      <p:sp>
+        <p:nvSpPr>
+          <p:cNvPr id="3" name="Content Placeholder 2"/>
+          <p:cNvSpPr>
+            <a:spLocks noGrp="1"/>
+          </p:cNvSpPr>
+          <p:nvPr>
+            <p:ph sz="quarter" idx="11"/>
+          </p:nvPr>
+        </p:nvSpPr>
+        <p:spPr/>
+        <p:txBody>
+          <a:bodyPr/>
+          <a:lstStyle/>
+          <a:p>
+            <a:r>
+              <a:rPr lang="en-US" dirty="0" err="1"/>
+              <a:t>Berksfile</a:t>
+            </a:r>
+            <a:r>
+              <a:rPr lang="en-US" dirty="0"/>
+              <a:t>       </a:t>
+            </a:r>
+            <a:r>
+              <a:rPr lang="en-US" dirty="0" err="1"/>
+              <a:t>config.json</a:t>
+            </a:r>
+            <a:r>
+              <a:rPr lang="en-US" dirty="0"/>
+              <a:t>  local-mode-cache  profiles</a:t>
+            </a:r>
+          </a:p>
+          <a:p>
+            <a:r>
+              <a:rPr lang="en-US" dirty="0" err="1"/>
+              <a:t>Berksfile.lock</a:t>
+            </a:r>
+            <a:r>
+              <a:rPr lang="en-US" dirty="0"/>
+              <a:t>  cookbooks    nodes</a:t>
+            </a:r>
+          </a:p>
+          <a:p>
+            <a:endParaRPr lang="en-US" b="1" dirty="0"/>
+          </a:p>
+        </p:txBody>
+      </p:sp>
+      <p:sp>
+        <p:nvSpPr>
+          <p:cNvPr id="4" name="Text Placeholder 3"/>
+          <p:cNvSpPr>
+            <a:spLocks noGrp="1"/>
+          </p:cNvSpPr>
+          <p:nvPr>
+            <p:ph type="body" sz="quarter" idx="12"/>
+          </p:nvPr>
+        </p:nvSpPr>
+        <p:spPr/>
+        <p:txBody>
+          <a:bodyPr/>
+          <a:lstStyle/>
+          <a:p>
+            <a:r>
+              <a:rPr lang="en-US" dirty="0" err="1" smtClean="0"/>
+              <a:t>ls</a:t>
+            </a:r>
+            <a:endParaRPr lang="en-US" dirty="0"/>
+          </a:p>
+        </p:txBody>
+      </p:sp>
+    </p:spTree>
+    <p:extLst>
+      <p:ext uri="{BB962C8B-B14F-4D97-AF65-F5344CB8AC3E}">
+        <p14:creationId xmlns:p14="http://schemas.microsoft.com/office/powerpoint/2010/main" val="4106926164"/>
+      </p:ext>
+    </p:extLst>
+  </p:cSld>
+  <p:clrMapOvr>
+    <a:masterClrMapping/>
+  </p:clrMapOvr>
+  <mc:AlternateContent xmlns:mc="http://schemas.openxmlformats.org/markup-compatibility/2006" xmlns:p14="http://schemas.microsoft.com/office/powerpoint/2010/main">
+    <mc:Choice Requires="p14">
+      <p:transition spd="med" p14:dur="700">
+        <p:fade/>
+      </p:transition>
+    </mc:Choice>
+    <mc:Fallback xmlns="">
+      <p:transition spd="med">
+        <p:fade/>
+      </p:transition>
+    </mc:Fallback>
+  </mc:AlternateContent>
+  <p:timing>
+    <p:tnLst>
+      <p:par>
+        <p:cTn xmlns:p14="http://schemas.microsoft.com/office/powerpoint/2010/main" id="1" dur="indefinite" restart="never" nodeType="tmRoot"/>
+      </p:par>
+    </p:tnLst>
+  </p:timing>
+</p:sld>
+</file>
+
+<file path=ppt/slides/slide27.xml><?xml version="1.0" encoding="utf-8"?>
+<p:sld xmlns:a="http://schemas.openxmlformats.org/drawingml/2006/main" xmlns:r="http://schemas.openxmlformats.org/officeDocument/2006/relationships" xmlns:p="http://schemas.openxmlformats.org/presentationml/2006/main">
+  <p:cSld>
+    <p:spTree>
+      <p:nvGrpSpPr>
+        <p:cNvPr id="1" name=""/>
+        <p:cNvGrpSpPr/>
+        <p:nvPr/>
+      </p:nvGrpSpPr>
+      <p:grpSpPr>
+        <a:xfrm>
+          <a:off x="0" y="0"/>
+          <a:ext cx="0" cy="0"/>
+          <a:chOff x="0" y="0"/>
+          <a:chExt cx="0" cy="0"/>
+        </a:xfrm>
+      </p:grpSpPr>
+      <p:sp>
+        <p:nvSpPr>
+          <p:cNvPr id="2" name="Title 1"/>
+          <p:cNvSpPr>
+            <a:spLocks noGrp="1"/>
+          </p:cNvSpPr>
+          <p:nvPr>
+            <p:ph type="title"/>
+          </p:nvPr>
+        </p:nvSpPr>
+        <p:spPr/>
+        <p:txBody>
+          <a:bodyPr/>
+          <a:lstStyle/>
+          <a:p>
+            <a:r>
+              <a:rPr lang="en-US" dirty="0" err="1" smtClean="0"/>
+              <a:t>config.json</a:t>
+            </a:r>
+            <a:endParaRPr lang="en-US" dirty="0"/>
+          </a:p>
+        </p:txBody>
+      </p:sp>
+      <p:sp>
+        <p:nvSpPr>
+          <p:cNvPr id="3" name="Content Placeholder 2"/>
+          <p:cNvSpPr>
+            <a:spLocks noGrp="1"/>
+          </p:cNvSpPr>
+          <p:nvPr>
+            <p:ph sz="quarter" idx="11"/>
+          </p:nvPr>
+        </p:nvSpPr>
+        <p:spPr/>
+        <p:txBody>
+          <a:bodyPr>
+            <a:normAutofit fontScale="92500" lnSpcReduction="10000"/>
+          </a:bodyPr>
+          <a:lstStyle/>
+          <a:p>
+            <a:r>
+              <a:rPr lang="mr-IN" dirty="0"/>
+              <a:t>{</a:t>
+            </a:r>
+          </a:p>
+          <a:p>
+            <a:r>
+              <a:rPr lang="mr-IN" dirty="0"/>
+              <a:t>  "audit": {</a:t>
+            </a:r>
+          </a:p>
+          <a:p>
+            <a:r>
+              <a:rPr lang="mr-IN" dirty="0"/>
+              <a:t>    "collector": "chef-visibility",</a:t>
+            </a:r>
+          </a:p>
+          <a:p>
+            <a:r>
+              <a:rPr lang="mr-IN" dirty="0"/>
+              <a:t>    "inspec_version": "1.15.0",</a:t>
+            </a:r>
+          </a:p>
+          <a:p>
+            <a:r>
+              <a:rPr lang="mr-IN" dirty="0"/>
+              <a:t>    "profiles": [</a:t>
+            </a:r>
+          </a:p>
+          <a:p>
+            <a:r>
+              <a:rPr lang="mr-IN" dirty="0"/>
+              <a:t>      {</a:t>
+            </a:r>
+          </a:p>
+          <a:p>
+            <a:r>
+              <a:rPr lang="mr-IN" dirty="0"/>
+              <a:t>        "name": "ssh",</a:t>
+            </a:r>
+          </a:p>
+          <a:p>
+            <a:r>
+              <a:rPr lang="mr-IN" dirty="0"/>
+              <a:t>        "path": "/home/chef/profiles/ssh"</a:t>
+            </a:r>
+          </a:p>
+          <a:p>
+            <a:r>
+              <a:rPr lang="mr-IN" dirty="0"/>
+              <a:t>      }</a:t>
+            </a:r>
+          </a:p>
+          <a:p>
+            <a:r>
+              <a:rPr lang="mr-IN" dirty="0"/>
+              <a:t>    ]</a:t>
+            </a:r>
+          </a:p>
+          <a:p>
+            <a:r>
+              <a:rPr lang="mr-IN" dirty="0"/>
+              <a:t>  </a:t>
+            </a:r>
+            <a:r>
+              <a:rPr lang="mr-IN" dirty="0" smtClean="0"/>
+              <a:t>}</a:t>
+            </a:r>
+            <a:endParaRPr lang="en-US" dirty="0" smtClean="0"/>
+          </a:p>
+          <a:p>
+            <a:r>
+              <a:rPr lang="en-US" dirty="0"/>
+              <a:t>}</a:t>
+            </a:r>
+            <a:endParaRPr lang="mr-IN" dirty="0"/>
+          </a:p>
+        </p:txBody>
+      </p:sp>
+      <p:sp>
+        <p:nvSpPr>
+          <p:cNvPr id="4" name="Text Placeholder 3"/>
+          <p:cNvSpPr>
+            <a:spLocks noGrp="1"/>
+          </p:cNvSpPr>
+          <p:nvPr>
+            <p:ph type="body" sz="quarter" idx="12"/>
+          </p:nvPr>
+        </p:nvSpPr>
+        <p:spPr/>
+        <p:txBody>
+          <a:bodyPr/>
+          <a:lstStyle/>
+          <a:p>
+            <a:r>
+              <a:rPr lang="en-US" dirty="0" smtClean="0"/>
+              <a:t>cat </a:t>
+            </a:r>
+            <a:r>
+              <a:rPr lang="en-US" dirty="0" err="1" smtClean="0"/>
+              <a:t>config.json</a:t>
+            </a:r>
+            <a:endParaRPr lang="en-US" dirty="0"/>
+          </a:p>
+        </p:txBody>
+      </p:sp>
+    </p:spTree>
+    <p:extLst>
+      <p:ext uri="{BB962C8B-B14F-4D97-AF65-F5344CB8AC3E}">
+        <p14:creationId xmlns:p14="http://schemas.microsoft.com/office/powerpoint/2010/main" val="90576953"/>
+      </p:ext>
+    </p:extLst>
+  </p:cSld>
+  <p:clrMapOvr>
+    <a:masterClrMapping/>
+  </p:clrMapOvr>
+  <mc:AlternateContent xmlns:mc="http://schemas.openxmlformats.org/markup-compatibility/2006" xmlns:p14="http://schemas.microsoft.com/office/powerpoint/2010/main">
+    <mc:Choice Requires="p14">
+      <p:transition spd="med" p14:dur="700">
+        <p:fade/>
+      </p:transition>
+    </mc:Choice>
+    <mc:Fallback xmlns="">
+      <p:transition spd="med">
+        <p:fade/>
+      </p:transition>
+    </mc:Fallback>
+  </mc:AlternateContent>
+  <p:timing>
+    <p:tnLst>
+      <p:par>
+        <p:cTn xmlns:p14="http://schemas.microsoft.com/office/powerpoint/2010/main" id="1" dur="indefinite" restart="never" nodeType="tmRoot"/>
+      </p:par>
+    </p:tnLst>
+  </p:timing>
+</p:sld>
+</file>
+
+<file path=ppt/slides/slide28.xml><?xml version="1.0" encoding="utf-8"?>
+<p:sld xmlns:a="http://schemas.openxmlformats.org/drawingml/2006/main" xmlns:r="http://schemas.openxmlformats.org/officeDocument/2006/relationships" xmlns:p="http://schemas.openxmlformats.org/presentationml/2006/main">
+  <p:cSld>
+    <p:spTree>
+      <p:nvGrpSpPr>
+        <p:cNvPr id="1" name=""/>
+        <p:cNvGrpSpPr/>
+        <p:nvPr/>
+      </p:nvGrpSpPr>
+      <p:grpSpPr>
+        <a:xfrm>
+          <a:off x="0" y="0"/>
+          <a:ext cx="0" cy="0"/>
+          <a:chOff x="0" y="0"/>
+          <a:chExt cx="0" cy="0"/>
+        </a:xfrm>
+      </p:grpSpPr>
+      <p:sp>
+        <p:nvSpPr>
+          <p:cNvPr id="5" name="Title 4"/>
+          <p:cNvSpPr>
+            <a:spLocks noGrp="1"/>
+          </p:cNvSpPr>
+          <p:nvPr>
+            <p:ph type="title"/>
+          </p:nvPr>
+        </p:nvSpPr>
+        <p:spPr/>
+        <p:txBody>
+          <a:bodyPr/>
+          <a:lstStyle/>
+          <a:p>
+            <a:r>
+              <a:rPr lang="en-US" dirty="0" smtClean="0"/>
+              <a:t>Audit Cookbook</a:t>
+            </a:r>
+            <a:endParaRPr lang="en-US" dirty="0"/>
+          </a:p>
+        </p:txBody>
+      </p:sp>
+      <p:sp>
+        <p:nvSpPr>
+          <p:cNvPr id="6" name="Text Placeholder 5"/>
+          <p:cNvSpPr>
+            <a:spLocks noGrp="1"/>
+          </p:cNvSpPr>
+          <p:nvPr>
+            <p:ph type="body" sz="quarter" idx="10"/>
+          </p:nvPr>
+        </p:nvSpPr>
+        <p:spPr/>
+        <p:txBody>
+          <a:bodyPr/>
+          <a:lstStyle/>
+          <a:p>
+            <a:r>
+              <a:rPr lang="en-US" dirty="0" smtClean="0"/>
+              <a:t>Installs </a:t>
+            </a:r>
+            <a:r>
+              <a:rPr lang="en-US" dirty="0" err="1" smtClean="0"/>
+              <a:t>InSpec</a:t>
+            </a:r>
+            <a:endParaRPr lang="en-US" dirty="0" smtClean="0"/>
+          </a:p>
+          <a:p>
+            <a:r>
+              <a:rPr lang="en-US" dirty="0" smtClean="0"/>
+              <a:t>Executes compliance profiles</a:t>
+            </a:r>
+          </a:p>
+          <a:p>
+            <a:r>
+              <a:rPr lang="en-US" dirty="0" smtClean="0"/>
+              <a:t>Uses a report handler to send data to Chef Automate</a:t>
+            </a:r>
+          </a:p>
+        </p:txBody>
+      </p:sp>
+    </p:spTree>
+    <p:extLst>
+      <p:ext uri="{BB962C8B-B14F-4D97-AF65-F5344CB8AC3E}">
+        <p14:creationId xmlns:p14="http://schemas.microsoft.com/office/powerpoint/2010/main" val="1354841192"/>
+      </p:ext>
+    </p:extLst>
+  </p:cSld>
+  <p:clrMapOvr>
+    <a:masterClrMapping/>
+  </p:clrMapOvr>
+  <mc:AlternateContent xmlns:mc="http://schemas.openxmlformats.org/markup-compatibility/2006" xmlns:p14="http://schemas.microsoft.com/office/powerpoint/2010/main">
+    <mc:Choice Requires="p14">
+      <p:transition spd="med" p14:dur="700">
+        <p:fade/>
+      </p:transition>
+    </mc:Choice>
+    <mc:Fallback xmlns="">
+      <p:transition spd="med">
+        <p:fade/>
+      </p:transition>
+    </mc:Fallback>
+  </mc:AlternateContent>
+  <p:timing>
+    <p:tnLst>
+      <p:par>
+        <p:cTn xmlns:p14="http://schemas.microsoft.com/office/powerpoint/2010/main" id="1" dur="indefinite" restart="never" nodeType="tmRoot"/>
+      </p:par>
+    </p:tnLst>
+  </p:timing>
+</p:sld>
+</file>
+
+<file path=ppt/slides/slide29.xml><?xml version="1.0" encoding="utf-8"?>
+<p:sld xmlns:a="http://schemas.openxmlformats.org/drawingml/2006/main" xmlns:r="http://schemas.openxmlformats.org/officeDocument/2006/relationships" xmlns:p="http://schemas.openxmlformats.org/presentationml/2006/main">
+  <p:cSld>
+    <p:spTree>
+      <p:nvGrpSpPr>
+        <p:cNvPr id="1" name=""/>
+        <p:cNvGrpSpPr/>
+        <p:nvPr/>
+      </p:nvGrpSpPr>
+      <p:grpSpPr>
+        <a:xfrm>
+          <a:off x="0" y="0"/>
+          <a:ext cx="0" cy="0"/>
+          <a:chOff x="0" y="0"/>
+          <a:chExt cx="0" cy="0"/>
+        </a:xfrm>
+      </p:grpSpPr>
+      <p:sp>
+        <p:nvSpPr>
+          <p:cNvPr id="2" name="Title 1"/>
+          <p:cNvSpPr>
+            <a:spLocks noGrp="1"/>
+          </p:cNvSpPr>
+          <p:nvPr>
+            <p:ph type="title"/>
+          </p:nvPr>
+        </p:nvSpPr>
+        <p:spPr/>
+        <p:txBody>
+          <a:bodyPr/>
+          <a:lstStyle/>
+          <a:p>
+            <a:r>
+              <a:rPr lang="en-US" dirty="0" smtClean="0"/>
+              <a:t>Local Profiles</a:t>
+            </a:r>
+            <a:endParaRPr lang="en-US" dirty="0"/>
+          </a:p>
+        </p:txBody>
+      </p:sp>
+      <p:sp>
+        <p:nvSpPr>
+          <p:cNvPr id="3" name="Content Placeholder 2"/>
+          <p:cNvSpPr>
+            <a:spLocks noGrp="1"/>
+          </p:cNvSpPr>
+          <p:nvPr>
+            <p:ph sz="quarter" idx="11"/>
+          </p:nvPr>
+        </p:nvSpPr>
+        <p:spPr/>
+        <p:txBody>
+          <a:bodyPr/>
+          <a:lstStyle/>
+          <a:p>
+            <a:r>
+              <a:rPr lang="en-US" dirty="0"/>
+              <a:t>profiles/</a:t>
+            </a:r>
+          </a:p>
+          <a:p>
+            <a:r>
+              <a:rPr lang="en-US" dirty="0"/>
+              <a:t>└── </a:t>
+            </a:r>
+            <a:r>
+              <a:rPr lang="en-US" dirty="0" err="1"/>
+              <a:t>ssh</a:t>
+            </a:r>
+            <a:endParaRPr lang="en-US" dirty="0"/>
+          </a:p>
+          <a:p>
+            <a:r>
+              <a:rPr lang="en-US" dirty="0"/>
+              <a:t>    ├── controls</a:t>
+            </a:r>
+          </a:p>
+          <a:p>
+            <a:r>
+              <a:rPr lang="en-US" dirty="0"/>
+              <a:t>    │   └── </a:t>
+            </a:r>
+            <a:r>
+              <a:rPr lang="en-US" dirty="0" err="1"/>
+              <a:t>ssh.rb</a:t>
+            </a:r>
+            <a:endParaRPr lang="en-US" dirty="0"/>
+          </a:p>
+          <a:p>
+            <a:r>
+              <a:rPr lang="en-US" dirty="0"/>
+              <a:t>    ├── </a:t>
+            </a:r>
+            <a:r>
+              <a:rPr lang="en-US" dirty="0" err="1"/>
+              <a:t>inspec.lock</a:t>
+            </a:r>
+            <a:endParaRPr lang="en-US" dirty="0"/>
+          </a:p>
+          <a:p>
+            <a:r>
+              <a:rPr lang="en-US" dirty="0"/>
+              <a:t>    └── </a:t>
+            </a:r>
+            <a:r>
+              <a:rPr lang="en-US" dirty="0" err="1"/>
+              <a:t>inspec.yml</a:t>
+            </a:r>
+            <a:endParaRPr lang="en-US" dirty="0"/>
+          </a:p>
+          <a:p>
+            <a:endParaRPr lang="en-US" dirty="0"/>
+          </a:p>
+          <a:p>
+            <a:r>
+              <a:rPr lang="en-US" dirty="0"/>
+              <a:t>2 directories, 3 files</a:t>
+            </a:r>
+          </a:p>
+          <a:p>
+            <a:endParaRPr lang="en-US" dirty="0"/>
+          </a:p>
+        </p:txBody>
+      </p:sp>
+      <p:sp>
+        <p:nvSpPr>
+          <p:cNvPr id="4" name="Text Placeholder 3"/>
+          <p:cNvSpPr>
+            <a:spLocks noGrp="1"/>
+          </p:cNvSpPr>
+          <p:nvPr>
+            <p:ph type="body" sz="quarter" idx="12"/>
+          </p:nvPr>
+        </p:nvSpPr>
+        <p:spPr/>
+        <p:txBody>
+          <a:bodyPr/>
+          <a:lstStyle/>
+          <a:p>
+            <a:r>
+              <a:rPr lang="en-US" dirty="0" smtClean="0"/>
+              <a:t>tree profiles</a:t>
+            </a:r>
+            <a:endParaRPr lang="en-US" dirty="0"/>
+          </a:p>
+        </p:txBody>
+      </p:sp>
+    </p:spTree>
+    <p:extLst>
+      <p:ext uri="{BB962C8B-B14F-4D97-AF65-F5344CB8AC3E}">
+        <p14:creationId xmlns:p14="http://schemas.microsoft.com/office/powerpoint/2010/main" val="1404056138"/>
+      </p:ext>
+    </p:extLst>
+  </p:cSld>
+  <p:clrMapOvr>
+    <a:masterClrMapping/>
+  </p:clrMapOvr>
+  <mc:AlternateContent xmlns:mc="http://schemas.openxmlformats.org/markup-compatibility/2006" xmlns:p14="http://schemas.microsoft.com/office/powerpoint/2010/main">
+    <mc:Choice Requires="p14">
+      <p:transition spd="med" p14:dur="700">
+        <p:fade/>
+      </p:transition>
+    </mc:Choice>
+    <mc:Fallback xmlns="">
+      <p:transition spd="med">
+        <p:fade/>
+      </p:transition>
+    </mc:Fallback>
+  </mc:AlternateContent>
+  <p:timing>
+    <p:tnLst>
+      <p:par>
+        <p:cTn xmlns:p14="http://schemas.microsoft.com/office/powerpoint/2010/main" id="1" dur="indefinite" restart="never" nodeType="tmRoot"/>
+      </p:par>
+    </p:tnLst>
+  </p:timing>
 </p:sld>
 </file>
 
@@ -12868,6 +13723,1022 @@
     <p:extLst>
       <p:ext uri="{BB962C8B-B14F-4D97-AF65-F5344CB8AC3E}">
         <p14:creationId xmlns:p14="http://schemas.microsoft.com/office/powerpoint/2010/main" val="3182504384"/>
+      </p:ext>
+    </p:extLst>
+  </p:cSld>
+  <p:clrMapOvr>
+    <a:masterClrMapping/>
+  </p:clrMapOvr>
+  <mc:AlternateContent xmlns:mc="http://schemas.openxmlformats.org/markup-compatibility/2006" xmlns:p14="http://schemas.microsoft.com/office/powerpoint/2010/main">
+    <mc:Choice Requires="p14">
+      <p:transition spd="med" p14:dur="700">
+        <p:fade/>
+      </p:transition>
+    </mc:Choice>
+    <mc:Fallback xmlns="">
+      <p:transition spd="med">
+        <p:fade/>
+      </p:transition>
+    </mc:Fallback>
+  </mc:AlternateContent>
+  <p:timing>
+    <p:tnLst>
+      <p:par>
+        <p:cTn xmlns:p14="http://schemas.microsoft.com/office/powerpoint/2010/main" id="1" dur="indefinite" restart="never" nodeType="tmRoot"/>
+      </p:par>
+    </p:tnLst>
+  </p:timing>
+</p:sld>
+</file>
+
+<file path=ppt/slides/slide30.xml><?xml version="1.0" encoding="utf-8"?>
+<p:sld xmlns:a="http://schemas.openxmlformats.org/drawingml/2006/main" xmlns:r="http://schemas.openxmlformats.org/officeDocument/2006/relationships" xmlns:p="http://schemas.openxmlformats.org/presentationml/2006/main">
+  <p:cSld>
+    <p:spTree>
+      <p:nvGrpSpPr>
+        <p:cNvPr id="1" name=""/>
+        <p:cNvGrpSpPr/>
+        <p:nvPr/>
+      </p:nvGrpSpPr>
+      <p:grpSpPr>
+        <a:xfrm>
+          <a:off x="0" y="0"/>
+          <a:ext cx="0" cy="0"/>
+          <a:chOff x="0" y="0"/>
+          <a:chExt cx="0" cy="0"/>
+        </a:xfrm>
+      </p:grpSpPr>
+      <p:sp>
+        <p:nvSpPr>
+          <p:cNvPr id="2" name="Title 1"/>
+          <p:cNvSpPr>
+            <a:spLocks noGrp="1"/>
+          </p:cNvSpPr>
+          <p:nvPr>
+            <p:ph type="title"/>
+          </p:nvPr>
+        </p:nvSpPr>
+        <p:spPr/>
+        <p:txBody>
+          <a:bodyPr/>
+          <a:lstStyle/>
+          <a:p>
+            <a:r>
+              <a:rPr lang="en-US" dirty="0" smtClean="0"/>
+              <a:t>Run Locally with </a:t>
+            </a:r>
+            <a:r>
+              <a:rPr lang="en-US" dirty="0" err="1" smtClean="0"/>
+              <a:t>InSpec</a:t>
+            </a:r>
+            <a:endParaRPr lang="en-US" dirty="0"/>
+          </a:p>
+        </p:txBody>
+      </p:sp>
+      <p:sp>
+        <p:nvSpPr>
+          <p:cNvPr id="3" name="Content Placeholder 2"/>
+          <p:cNvSpPr>
+            <a:spLocks noGrp="1"/>
+          </p:cNvSpPr>
+          <p:nvPr>
+            <p:ph sz="quarter" idx="11"/>
+          </p:nvPr>
+        </p:nvSpPr>
+        <p:spPr/>
+        <p:txBody>
+          <a:bodyPr>
+            <a:normAutofit fontScale="47500" lnSpcReduction="20000"/>
+          </a:bodyPr>
+          <a:lstStyle/>
+          <a:p>
+            <a:r>
+              <a:rPr lang="en-US" dirty="0"/>
+              <a:t>Profile: SSH Configuration (</a:t>
+            </a:r>
+            <a:r>
+              <a:rPr lang="en-US" dirty="0" err="1"/>
+              <a:t>ssh</a:t>
+            </a:r>
+            <a:r>
+              <a:rPr lang="en-US" dirty="0"/>
+              <a:t>)</a:t>
+            </a:r>
+          </a:p>
+          <a:p>
+            <a:r>
+              <a:rPr lang="en-US" dirty="0"/>
+              <a:t>Version: 0.1.0</a:t>
+            </a:r>
+          </a:p>
+          <a:p>
+            <a:r>
+              <a:rPr lang="en-US" dirty="0"/>
+              <a:t>Target:  local://</a:t>
+            </a:r>
+          </a:p>
+          <a:p>
+            <a:endParaRPr lang="en-US" dirty="0"/>
+          </a:p>
+          <a:p>
+            <a:r>
+              <a:rPr lang="en-US" dirty="0"/>
+              <a:t>  ×  sshd-1.0: SSH Version 2 (</a:t>
+            </a:r>
+          </a:p>
+          <a:p>
+            <a:r>
+              <a:rPr lang="en-US" dirty="0"/>
+              <a:t>     expected: 2</a:t>
+            </a:r>
+          </a:p>
+          <a:p>
+            <a:r>
+              <a:rPr lang="en-US" dirty="0"/>
+              <a:t>          got:</a:t>
+            </a:r>
+          </a:p>
+          <a:p>
+            <a:endParaRPr lang="en-US" dirty="0"/>
+          </a:p>
+          <a:p>
+            <a:r>
+              <a:rPr lang="en-US" dirty="0"/>
+              <a:t>     (compared using `</a:t>
+            </a:r>
+            <a:r>
+              <a:rPr lang="en-US" dirty="0" err="1"/>
+              <a:t>cmp</a:t>
+            </a:r>
+            <a:r>
+              <a:rPr lang="en-US" dirty="0"/>
+              <a:t>` matcher)</a:t>
+            </a:r>
+          </a:p>
+          <a:p>
+            <a:r>
+              <a:rPr lang="en-US" dirty="0"/>
+              <a:t>     )</a:t>
+            </a:r>
+          </a:p>
+          <a:p>
+            <a:r>
+              <a:rPr lang="en-US" dirty="0"/>
+              <a:t>     ×  SSH Configuration Protocol should </a:t>
+            </a:r>
+            <a:r>
+              <a:rPr lang="en-US" dirty="0" err="1"/>
+              <a:t>cmp</a:t>
+            </a:r>
+            <a:r>
+              <a:rPr lang="en-US" dirty="0"/>
+              <a:t> == 2</a:t>
+            </a:r>
+          </a:p>
+          <a:p>
+            <a:endParaRPr lang="en-US" dirty="0"/>
+          </a:p>
+          <a:p>
+            <a:r>
+              <a:rPr lang="en-US" dirty="0"/>
+              <a:t>     expected: 2</a:t>
+            </a:r>
+          </a:p>
+          <a:p>
+            <a:r>
+              <a:rPr lang="en-US" dirty="0"/>
+              <a:t>          got:</a:t>
+            </a:r>
+          </a:p>
+          <a:p>
+            <a:endParaRPr lang="en-US" dirty="0"/>
+          </a:p>
+          <a:p>
+            <a:r>
+              <a:rPr lang="en-US" dirty="0"/>
+              <a:t>     (compared using `</a:t>
+            </a:r>
+            <a:r>
+              <a:rPr lang="en-US" dirty="0" err="1"/>
+              <a:t>cmp</a:t>
+            </a:r>
+            <a:r>
+              <a:rPr lang="en-US" dirty="0"/>
+              <a:t>` matcher)</a:t>
+            </a:r>
+          </a:p>
+          <a:p>
+            <a:endParaRPr lang="en-US" dirty="0"/>
+          </a:p>
+          <a:p>
+            <a:endParaRPr lang="en-US" dirty="0"/>
+          </a:p>
+          <a:p>
+            <a:r>
+              <a:rPr lang="en-US" dirty="0"/>
+              <a:t>Profile Summary: 0 successful, 1 failures, 0 skipped</a:t>
+            </a:r>
+          </a:p>
+          <a:p>
+            <a:r>
+              <a:rPr lang="en-US" dirty="0"/>
+              <a:t>Test Summary: 0 successful, 1 failures, 0 skipped</a:t>
+            </a:r>
+          </a:p>
+          <a:p>
+            <a:endParaRPr lang="en-US" dirty="0"/>
+          </a:p>
+        </p:txBody>
+      </p:sp>
+      <p:sp>
+        <p:nvSpPr>
+          <p:cNvPr id="4" name="Text Placeholder 3"/>
+          <p:cNvSpPr>
+            <a:spLocks noGrp="1"/>
+          </p:cNvSpPr>
+          <p:nvPr>
+            <p:ph type="body" sz="quarter" idx="12"/>
+          </p:nvPr>
+        </p:nvSpPr>
+        <p:spPr/>
+        <p:txBody>
+          <a:bodyPr/>
+          <a:lstStyle/>
+          <a:p>
+            <a:r>
+              <a:rPr lang="en-US" dirty="0" err="1" smtClean="0"/>
+              <a:t>inspec</a:t>
+            </a:r>
+            <a:r>
+              <a:rPr lang="en-US" dirty="0" smtClean="0"/>
+              <a:t> exec profiles/</a:t>
+            </a:r>
+            <a:r>
+              <a:rPr lang="en-US" dirty="0" err="1" smtClean="0"/>
+              <a:t>ssh</a:t>
+            </a:r>
+            <a:endParaRPr lang="en-US" dirty="0"/>
+          </a:p>
+        </p:txBody>
+      </p:sp>
+    </p:spTree>
+    <p:extLst>
+      <p:ext uri="{BB962C8B-B14F-4D97-AF65-F5344CB8AC3E}">
+        <p14:creationId xmlns:p14="http://schemas.microsoft.com/office/powerpoint/2010/main" val="1095646581"/>
+      </p:ext>
+    </p:extLst>
+  </p:cSld>
+  <p:clrMapOvr>
+    <a:masterClrMapping/>
+  </p:clrMapOvr>
+  <mc:AlternateContent xmlns:mc="http://schemas.openxmlformats.org/markup-compatibility/2006" xmlns:p14="http://schemas.microsoft.com/office/powerpoint/2010/main">
+    <mc:Choice Requires="p14">
+      <p:transition spd="med" p14:dur="700">
+        <p:fade/>
+      </p:transition>
+    </mc:Choice>
+    <mc:Fallback xmlns="">
+      <p:transition spd="med">
+        <p:fade/>
+      </p:transition>
+    </mc:Fallback>
+  </mc:AlternateContent>
+  <p:timing>
+    <p:tnLst>
+      <p:par>
+        <p:cTn xmlns:p14="http://schemas.microsoft.com/office/powerpoint/2010/main" id="1" dur="indefinite" restart="never" nodeType="tmRoot"/>
+      </p:par>
+    </p:tnLst>
+  </p:timing>
+</p:sld>
+</file>
+
+<file path=ppt/slides/slide31.xml><?xml version="1.0" encoding="utf-8"?>
+<p:sld xmlns:a="http://schemas.openxmlformats.org/drawingml/2006/main" xmlns:r="http://schemas.openxmlformats.org/officeDocument/2006/relationships" xmlns:p="http://schemas.openxmlformats.org/presentationml/2006/main">
+  <p:cSld>
+    <p:spTree>
+      <p:nvGrpSpPr>
+        <p:cNvPr id="1" name=""/>
+        <p:cNvGrpSpPr/>
+        <p:nvPr/>
+      </p:nvGrpSpPr>
+      <p:grpSpPr>
+        <a:xfrm>
+          <a:off x="0" y="0"/>
+          <a:ext cx="0" cy="0"/>
+          <a:chOff x="0" y="0"/>
+          <a:chExt cx="0" cy="0"/>
+        </a:xfrm>
+      </p:grpSpPr>
+      <p:sp>
+        <p:nvSpPr>
+          <p:cNvPr id="7" name="Title 6"/>
+          <p:cNvSpPr>
+            <a:spLocks noGrp="1"/>
+          </p:cNvSpPr>
+          <p:nvPr>
+            <p:ph type="ctrTitle"/>
+          </p:nvPr>
+        </p:nvSpPr>
+        <p:spPr/>
+        <p:txBody>
+          <a:bodyPr/>
+          <a:lstStyle/>
+          <a:p>
+            <a:r>
+              <a:rPr lang="en-US" dirty="0" smtClean="0"/>
+              <a:t>Remediate the Failing Control</a:t>
+            </a:r>
+            <a:endParaRPr lang="en-US" dirty="0"/>
+          </a:p>
+        </p:txBody>
+      </p:sp>
+      <p:sp>
+        <p:nvSpPr>
+          <p:cNvPr id="8" name="Subtitle 7"/>
+          <p:cNvSpPr>
+            <a:spLocks noGrp="1"/>
+          </p:cNvSpPr>
+          <p:nvPr>
+            <p:ph type="subTitle" idx="1"/>
+          </p:nvPr>
+        </p:nvSpPr>
+        <p:spPr/>
+        <p:txBody>
+          <a:bodyPr/>
+          <a:lstStyle/>
+          <a:p>
+            <a:endParaRPr lang="en-US"/>
+          </a:p>
+        </p:txBody>
+      </p:sp>
+    </p:spTree>
+    <p:extLst>
+      <p:ext uri="{BB962C8B-B14F-4D97-AF65-F5344CB8AC3E}">
+        <p14:creationId xmlns:p14="http://schemas.microsoft.com/office/powerpoint/2010/main" val="3306305221"/>
+      </p:ext>
+    </p:extLst>
+  </p:cSld>
+  <p:clrMapOvr>
+    <a:masterClrMapping/>
+  </p:clrMapOvr>
+  <mc:AlternateContent xmlns:mc="http://schemas.openxmlformats.org/markup-compatibility/2006" xmlns:p14="http://schemas.microsoft.com/office/powerpoint/2010/main">
+    <mc:Choice Requires="p14">
+      <p:transition spd="med" p14:dur="700">
+        <p:fade/>
+      </p:transition>
+    </mc:Choice>
+    <mc:Fallback xmlns="">
+      <p:transition spd="med">
+        <p:fade/>
+      </p:transition>
+    </mc:Fallback>
+  </mc:AlternateContent>
+  <p:timing>
+    <p:tnLst>
+      <p:par>
+        <p:cTn xmlns:p14="http://schemas.microsoft.com/office/powerpoint/2010/main" id="1" dur="indefinite" restart="never" nodeType="tmRoot"/>
+      </p:par>
+    </p:tnLst>
+  </p:timing>
+</p:sld>
+</file>
+
+<file path=ppt/slides/slide32.xml><?xml version="1.0" encoding="utf-8"?>
+<p:sld xmlns:a="http://schemas.openxmlformats.org/drawingml/2006/main" xmlns:r="http://schemas.openxmlformats.org/officeDocument/2006/relationships" xmlns:p="http://schemas.openxmlformats.org/presentationml/2006/main">
+  <p:cSld>
+    <p:spTree>
+      <p:nvGrpSpPr>
+        <p:cNvPr id="1" name=""/>
+        <p:cNvGrpSpPr/>
+        <p:nvPr/>
+      </p:nvGrpSpPr>
+      <p:grpSpPr>
+        <a:xfrm>
+          <a:off x="0" y="0"/>
+          <a:ext cx="0" cy="0"/>
+          <a:chOff x="0" y="0"/>
+          <a:chExt cx="0" cy="0"/>
+        </a:xfrm>
+      </p:grpSpPr>
+      <p:sp>
+        <p:nvSpPr>
+          <p:cNvPr id="4" name="Title 3"/>
+          <p:cNvSpPr>
+            <a:spLocks noGrp="1"/>
+          </p:cNvSpPr>
+          <p:nvPr>
+            <p:ph type="title"/>
+          </p:nvPr>
+        </p:nvSpPr>
+        <p:spPr/>
+        <p:txBody>
+          <a:bodyPr/>
+          <a:lstStyle/>
+          <a:p>
+            <a:r>
+              <a:rPr lang="en-US" dirty="0" smtClean="0"/>
+              <a:t>Fix your </a:t>
+            </a:r>
+            <a:r>
+              <a:rPr lang="en-US" dirty="0" err="1" smtClean="0"/>
+              <a:t>ssh</a:t>
+            </a:r>
+            <a:r>
+              <a:rPr lang="en-US" dirty="0" smtClean="0"/>
+              <a:t> configuration on your own</a:t>
+            </a:r>
+            <a:endParaRPr lang="en-US" dirty="0"/>
+          </a:p>
+        </p:txBody>
+      </p:sp>
+      <p:sp>
+        <p:nvSpPr>
+          <p:cNvPr id="5" name="Text Placeholder 4"/>
+          <p:cNvSpPr>
+            <a:spLocks noGrp="1"/>
+          </p:cNvSpPr>
+          <p:nvPr>
+            <p:ph type="body" sz="quarter" idx="10"/>
+          </p:nvPr>
+        </p:nvSpPr>
+        <p:spPr/>
+        <p:txBody>
+          <a:bodyPr/>
+          <a:lstStyle/>
+          <a:p>
+            <a:r>
+              <a:rPr lang="en-US" dirty="0" smtClean="0"/>
+              <a:t>Write a cookbook to manage SSH</a:t>
+            </a:r>
+          </a:p>
+          <a:p>
+            <a:r>
+              <a:rPr lang="en-US" dirty="0" smtClean="0"/>
+              <a:t>Manually update the SSH configuration</a:t>
+            </a:r>
+            <a:endParaRPr lang="en-US" dirty="0"/>
+          </a:p>
+        </p:txBody>
+      </p:sp>
+    </p:spTree>
+    <p:extLst>
+      <p:ext uri="{BB962C8B-B14F-4D97-AF65-F5344CB8AC3E}">
+        <p14:creationId xmlns:p14="http://schemas.microsoft.com/office/powerpoint/2010/main" val="3928293892"/>
+      </p:ext>
+    </p:extLst>
+  </p:cSld>
+  <p:clrMapOvr>
+    <a:masterClrMapping/>
+  </p:clrMapOvr>
+  <mc:AlternateContent xmlns:mc="http://schemas.openxmlformats.org/markup-compatibility/2006" xmlns:p14="http://schemas.microsoft.com/office/powerpoint/2010/main">
+    <mc:Choice Requires="p14">
+      <p:transition spd="med" p14:dur="700">
+        <p:fade/>
+      </p:transition>
+    </mc:Choice>
+    <mc:Fallback xmlns="">
+      <p:transition spd="med">
+        <p:fade/>
+      </p:transition>
+    </mc:Fallback>
+  </mc:AlternateContent>
+  <p:timing>
+    <p:tnLst>
+      <p:par>
+        <p:cTn xmlns:p14="http://schemas.microsoft.com/office/powerpoint/2010/main" id="1" dur="indefinite" restart="never" nodeType="tmRoot"/>
+      </p:par>
+    </p:tnLst>
+  </p:timing>
+</p:sld>
+</file>
+
+<file path=ppt/slides/slide33.xml><?xml version="1.0" encoding="utf-8"?>
+<p:sld xmlns:a="http://schemas.openxmlformats.org/drawingml/2006/main" xmlns:r="http://schemas.openxmlformats.org/officeDocument/2006/relationships" xmlns:p="http://schemas.openxmlformats.org/presentationml/2006/main">
+  <p:cSld>
+    <p:spTree>
+      <p:nvGrpSpPr>
+        <p:cNvPr id="1" name=""/>
+        <p:cNvGrpSpPr/>
+        <p:nvPr/>
+      </p:nvGrpSpPr>
+      <p:grpSpPr>
+        <a:xfrm>
+          <a:off x="0" y="0"/>
+          <a:ext cx="0" cy="0"/>
+          <a:chOff x="0" y="0"/>
+          <a:chExt cx="0" cy="0"/>
+        </a:xfrm>
+      </p:grpSpPr>
+      <p:sp>
+        <p:nvSpPr>
+          <p:cNvPr id="2" name="Title 1"/>
+          <p:cNvSpPr>
+            <a:spLocks noGrp="1"/>
+          </p:cNvSpPr>
+          <p:nvPr>
+            <p:ph type="title"/>
+          </p:nvPr>
+        </p:nvSpPr>
+        <p:spPr/>
+        <p:txBody>
+          <a:bodyPr/>
+          <a:lstStyle/>
+          <a:p>
+            <a:r>
+              <a:rPr lang="en-US" dirty="0" smtClean="0"/>
+              <a:t>Remediate with Chef</a:t>
+            </a:r>
+            <a:endParaRPr lang="en-US" dirty="0"/>
+          </a:p>
+        </p:txBody>
+      </p:sp>
+      <p:sp>
+        <p:nvSpPr>
+          <p:cNvPr id="3" name="Content Placeholder 2"/>
+          <p:cNvSpPr>
+            <a:spLocks noGrp="1"/>
+          </p:cNvSpPr>
+          <p:nvPr>
+            <p:ph sz="quarter" idx="11"/>
+          </p:nvPr>
+        </p:nvSpPr>
+        <p:spPr/>
+        <p:txBody>
+          <a:bodyPr>
+            <a:normAutofit fontScale="62500" lnSpcReduction="20000"/>
+          </a:bodyPr>
+          <a:lstStyle/>
+          <a:p>
+            <a:r>
+              <a:rPr lang="en-US" dirty="0"/>
+              <a:t>[2017-03-10T16:48:02+00:00] INFO: Forking chef instance to converge...</a:t>
+            </a:r>
+          </a:p>
+          <a:p>
+            <a:r>
+              <a:rPr lang="en-US" dirty="0"/>
+              <a:t>Starting Chef Client, version 12.18.31</a:t>
+            </a:r>
+          </a:p>
+          <a:p>
+            <a:r>
+              <a:rPr lang="en-US" dirty="0"/>
+              <a:t>...</a:t>
+            </a:r>
+          </a:p>
+          <a:p>
+            <a:r>
+              <a:rPr lang="en-US" dirty="0"/>
+              <a:t>Synchronizing Cookbooks:</a:t>
+            </a:r>
+          </a:p>
+          <a:p>
+            <a:r>
+              <a:rPr lang="en-US" dirty="0"/>
+              <a:t>  - </a:t>
+            </a:r>
+            <a:r>
+              <a:rPr lang="en-US" dirty="0" err="1"/>
+              <a:t>ssh</a:t>
+            </a:r>
+            <a:r>
+              <a:rPr lang="en-US" dirty="0"/>
+              <a:t> (0.1.0)</a:t>
+            </a:r>
+          </a:p>
+          <a:p>
+            <a:r>
+              <a:rPr lang="en-US" dirty="0"/>
+              <a:t>  - audit (2.4.0)</a:t>
+            </a:r>
+          </a:p>
+          <a:p>
+            <a:r>
+              <a:rPr lang="en-US" dirty="0"/>
+              <a:t>  - </a:t>
+            </a:r>
+            <a:r>
+              <a:rPr lang="en-US" dirty="0" err="1"/>
+              <a:t>compat_resource</a:t>
+            </a:r>
+            <a:r>
+              <a:rPr lang="en-US" dirty="0"/>
+              <a:t> (12.16.3)</a:t>
+            </a:r>
+          </a:p>
+          <a:p>
+            <a:r>
+              <a:rPr lang="en-US" dirty="0"/>
+              <a:t>...</a:t>
+            </a:r>
+          </a:p>
+          <a:p>
+            <a:r>
+              <a:rPr lang="en-US" dirty="0"/>
+              <a:t>    -#Protocol 2</a:t>
+            </a:r>
+          </a:p>
+          <a:p>
+            <a:r>
+              <a:rPr lang="en-US" dirty="0"/>
+              <a:t>    +Protocol 2</a:t>
+            </a:r>
+          </a:p>
+          <a:p>
+            <a:r>
+              <a:rPr lang="en-US" dirty="0"/>
+              <a:t>...</a:t>
+            </a:r>
+          </a:p>
+          <a:p>
+            <a:r>
+              <a:rPr lang="en-US" dirty="0"/>
+              <a:t>[2017-03-10T16:48:05+00:00] INFO: Chef Run complete in 1.248588588 seconds</a:t>
+            </a:r>
+          </a:p>
+          <a:p>
+            <a:endParaRPr lang="en-US" dirty="0"/>
+          </a:p>
+          <a:p>
+            <a:r>
+              <a:rPr lang="en-US" dirty="0"/>
+              <a:t>Running handlers:</a:t>
+            </a:r>
+          </a:p>
+          <a:p>
+            <a:r>
+              <a:rPr lang="en-US" dirty="0"/>
+              <a:t>...</a:t>
+            </a:r>
+          </a:p>
+          <a:p>
+            <a:r>
+              <a:rPr lang="en-US" dirty="0"/>
+              <a:t>[2017-03-10T16:48:05+00:00] INFO: Report handlers complete</a:t>
+            </a:r>
+          </a:p>
+          <a:p>
+            <a:r>
+              <a:rPr lang="en-US" dirty="0"/>
+              <a:t>Chef Client finished, 1/3 resources updated in 03 seconds</a:t>
+            </a:r>
+          </a:p>
+        </p:txBody>
+      </p:sp>
+      <p:sp>
+        <p:nvSpPr>
+          <p:cNvPr id="4" name="Text Placeholder 3"/>
+          <p:cNvSpPr>
+            <a:spLocks noGrp="1"/>
+          </p:cNvSpPr>
+          <p:nvPr>
+            <p:ph type="body" sz="quarter" idx="12"/>
+          </p:nvPr>
+        </p:nvSpPr>
+        <p:spPr/>
+        <p:txBody>
+          <a:bodyPr>
+            <a:normAutofit fontScale="77500" lnSpcReduction="20000"/>
+          </a:bodyPr>
+          <a:lstStyle/>
+          <a:p>
+            <a:r>
+              <a:rPr lang="en-US" dirty="0" err="1"/>
+              <a:t>sudo</a:t>
+            </a:r>
+            <a:r>
+              <a:rPr lang="en-US" dirty="0"/>
+              <a:t> chef-client --local-mode -j </a:t>
+            </a:r>
+            <a:r>
+              <a:rPr lang="en-US" dirty="0" err="1"/>
+              <a:t>config.json</a:t>
+            </a:r>
+            <a:r>
+              <a:rPr lang="en-US" dirty="0"/>
+              <a:t> -r "recipe[</a:t>
+            </a:r>
+            <a:r>
+              <a:rPr lang="en-US" dirty="0" err="1"/>
+              <a:t>ssh</a:t>
+            </a:r>
+            <a:r>
+              <a:rPr lang="en-US" dirty="0"/>
+              <a:t>::server],recipe[audit::default]"</a:t>
+            </a:r>
+          </a:p>
+        </p:txBody>
+      </p:sp>
+    </p:spTree>
+    <p:extLst>
+      <p:ext uri="{BB962C8B-B14F-4D97-AF65-F5344CB8AC3E}">
+        <p14:creationId xmlns:p14="http://schemas.microsoft.com/office/powerpoint/2010/main" val="1907999452"/>
+      </p:ext>
+    </p:extLst>
+  </p:cSld>
+  <p:clrMapOvr>
+    <a:masterClrMapping/>
+  </p:clrMapOvr>
+  <mc:AlternateContent xmlns:mc="http://schemas.openxmlformats.org/markup-compatibility/2006" xmlns:p14="http://schemas.microsoft.com/office/powerpoint/2010/main">
+    <mc:Choice Requires="p14">
+      <p:transition spd="med" p14:dur="700">
+        <p:fade/>
+      </p:transition>
+    </mc:Choice>
+    <mc:Fallback xmlns="">
+      <p:transition spd="med">
+        <p:fade/>
+      </p:transition>
+    </mc:Fallback>
+  </mc:AlternateContent>
+  <p:timing>
+    <p:tnLst>
+      <p:par>
+        <p:cTn xmlns:p14="http://schemas.microsoft.com/office/powerpoint/2010/main" id="1" dur="indefinite" restart="never" nodeType="tmRoot"/>
+      </p:par>
+    </p:tnLst>
+  </p:timing>
+</p:sld>
+</file>
+
+<file path=ppt/slides/slide34.xml><?xml version="1.0" encoding="utf-8"?>
+<p:sld xmlns:a="http://schemas.openxmlformats.org/drawingml/2006/main" xmlns:r="http://schemas.openxmlformats.org/officeDocument/2006/relationships" xmlns:p="http://schemas.openxmlformats.org/presentationml/2006/main">
+  <p:cSld>
+    <p:spTree>
+      <p:nvGrpSpPr>
+        <p:cNvPr id="1" name=""/>
+        <p:cNvGrpSpPr/>
+        <p:nvPr/>
+      </p:nvGrpSpPr>
+      <p:grpSpPr>
+        <a:xfrm>
+          <a:off x="0" y="0"/>
+          <a:ext cx="0" cy="0"/>
+          <a:chOff x="0" y="0"/>
+          <a:chExt cx="0" cy="0"/>
+        </a:xfrm>
+      </p:grpSpPr>
+      <p:pic>
+        <p:nvPicPr>
+          <p:cNvPr id="4" name="Media Placeholder 3" descr="Chef_Automate.png"/>
+          <p:cNvPicPr>
+            <a:picLocks noGrp="1" noChangeAspect="1"/>
+          </p:cNvPicPr>
+          <p:nvPr>
+            <p:ph type="media" sz="quarter" idx="12"/>
+          </p:nvPr>
+        </p:nvPicPr>
+        <p:blipFill>
+          <a:blip r:embed="rId2">
+            <a:extLst>
+              <a:ext uri="{28A0092B-C50C-407E-A947-70E740481C1C}">
+                <a14:useLocalDpi xmlns:a14="http://schemas.microsoft.com/office/drawing/2010/main" val="0"/>
+              </a:ext>
+            </a:extLst>
+          </a:blip>
+          <a:srcRect t="12289" b="12289"/>
+          <a:stretch>
+            <a:fillRect/>
+          </a:stretch>
+        </p:blipFill>
+        <p:spPr/>
+      </p:pic>
+      <p:sp>
+        <p:nvSpPr>
+          <p:cNvPr id="3" name="Title 2"/>
+          <p:cNvSpPr>
+            <a:spLocks noGrp="1"/>
+          </p:cNvSpPr>
+          <p:nvPr>
+            <p:ph type="title"/>
+          </p:nvPr>
+        </p:nvSpPr>
+        <p:spPr/>
+        <p:txBody>
+          <a:bodyPr/>
+          <a:lstStyle/>
+          <a:p>
+            <a:r>
+              <a:rPr lang="en-US" dirty="0" smtClean="0"/>
+              <a:t>Verify Converge Status in Automate</a:t>
+            </a:r>
+            <a:endParaRPr lang="en-US" dirty="0"/>
+          </a:p>
+        </p:txBody>
+      </p:sp>
+    </p:spTree>
+    <p:extLst>
+      <p:ext uri="{BB962C8B-B14F-4D97-AF65-F5344CB8AC3E}">
+        <p14:creationId xmlns:p14="http://schemas.microsoft.com/office/powerpoint/2010/main" val="3167196052"/>
+      </p:ext>
+    </p:extLst>
+  </p:cSld>
+  <p:clrMapOvr>
+    <a:masterClrMapping/>
+  </p:clrMapOvr>
+  <mc:AlternateContent xmlns:mc="http://schemas.openxmlformats.org/markup-compatibility/2006" xmlns:p14="http://schemas.microsoft.com/office/powerpoint/2010/main">
+    <mc:Choice Requires="p14">
+      <p:transition spd="med" p14:dur="700">
+        <p:fade/>
+      </p:transition>
+    </mc:Choice>
+    <mc:Fallback xmlns="">
+      <p:transition spd="med">
+        <p:fade/>
+      </p:transition>
+    </mc:Fallback>
+  </mc:AlternateContent>
+  <p:timing>
+    <p:tnLst>
+      <p:par>
+        <p:cTn xmlns:p14="http://schemas.microsoft.com/office/powerpoint/2010/main" id="1" dur="indefinite" restart="never" nodeType="tmRoot"/>
+      </p:par>
+    </p:tnLst>
+  </p:timing>
+</p:sld>
+</file>
+
+<file path=ppt/slides/slide35.xml><?xml version="1.0" encoding="utf-8"?>
+<p:sld xmlns:a="http://schemas.openxmlformats.org/drawingml/2006/main" xmlns:r="http://schemas.openxmlformats.org/officeDocument/2006/relationships" xmlns:p="http://schemas.openxmlformats.org/presentationml/2006/main">
+  <p:cSld>
+    <p:spTree>
+      <p:nvGrpSpPr>
+        <p:cNvPr id="1" name=""/>
+        <p:cNvGrpSpPr/>
+        <p:nvPr/>
+      </p:nvGrpSpPr>
+      <p:grpSpPr>
+        <a:xfrm>
+          <a:off x="0" y="0"/>
+          <a:ext cx="0" cy="0"/>
+          <a:chOff x="0" y="0"/>
+          <a:chExt cx="0" cy="0"/>
+        </a:xfrm>
+      </p:grpSpPr>
+      <p:pic>
+        <p:nvPicPr>
+          <p:cNvPr id="4" name="Media Placeholder 3" descr="Chef_Automate.png"/>
+          <p:cNvPicPr>
+            <a:picLocks noGrp="1" noChangeAspect="1"/>
+          </p:cNvPicPr>
+          <p:nvPr>
+            <p:ph type="media" sz="quarter" idx="12"/>
+          </p:nvPr>
+        </p:nvPicPr>
+        <p:blipFill>
+          <a:blip r:embed="rId2">
+            <a:extLst>
+              <a:ext uri="{28A0092B-C50C-407E-A947-70E740481C1C}">
+                <a14:useLocalDpi xmlns:a14="http://schemas.microsoft.com/office/drawing/2010/main" val="0"/>
+              </a:ext>
+            </a:extLst>
+          </a:blip>
+          <a:srcRect t="5864" b="5864"/>
+          <a:stretch>
+            <a:fillRect/>
+          </a:stretch>
+        </p:blipFill>
+        <p:spPr/>
+      </p:pic>
+      <p:sp>
+        <p:nvSpPr>
+          <p:cNvPr id="3" name="Title 2"/>
+          <p:cNvSpPr>
+            <a:spLocks noGrp="1"/>
+          </p:cNvSpPr>
+          <p:nvPr>
+            <p:ph type="title"/>
+          </p:nvPr>
+        </p:nvSpPr>
+        <p:spPr/>
+        <p:txBody>
+          <a:bodyPr/>
+          <a:lstStyle/>
+          <a:p>
+            <a:r>
+              <a:rPr lang="en-US" dirty="0"/>
+              <a:t>Verify </a:t>
+            </a:r>
+            <a:r>
+              <a:rPr lang="en-US" dirty="0" smtClean="0"/>
+              <a:t>Compliance Status </a:t>
+            </a:r>
+            <a:r>
+              <a:rPr lang="en-US" dirty="0"/>
+              <a:t>in Automate</a:t>
+            </a:r>
+          </a:p>
+        </p:txBody>
+      </p:sp>
+    </p:spTree>
+    <p:extLst>
+      <p:ext uri="{BB962C8B-B14F-4D97-AF65-F5344CB8AC3E}">
+        <p14:creationId xmlns:p14="http://schemas.microsoft.com/office/powerpoint/2010/main" val="1491139915"/>
+      </p:ext>
+    </p:extLst>
+  </p:cSld>
+  <p:clrMapOvr>
+    <a:masterClrMapping/>
+  </p:clrMapOvr>
+  <mc:AlternateContent xmlns:mc="http://schemas.openxmlformats.org/markup-compatibility/2006" xmlns:p14="http://schemas.microsoft.com/office/powerpoint/2010/main">
+    <mc:Choice Requires="p14">
+      <p:transition spd="med" p14:dur="700">
+        <p:fade/>
+      </p:transition>
+    </mc:Choice>
+    <mc:Fallback xmlns="">
+      <p:transition spd="med">
+        <p:fade/>
+      </p:transition>
+    </mc:Fallback>
+  </mc:AlternateContent>
+  <p:timing>
+    <p:tnLst>
+      <p:par>
+        <p:cTn xmlns:p14="http://schemas.microsoft.com/office/powerpoint/2010/main" id="1" dur="indefinite" restart="never" nodeType="tmRoot"/>
+      </p:par>
+    </p:tnLst>
+  </p:timing>
+</p:sld>
+</file>
+
+<file path=ppt/slides/slide36.xml><?xml version="1.0" encoding="utf-8"?>
+<p:sld xmlns:a="http://schemas.openxmlformats.org/drawingml/2006/main" xmlns:r="http://schemas.openxmlformats.org/officeDocument/2006/relationships" xmlns:p="http://schemas.openxmlformats.org/presentationml/2006/main">
+  <p:cSld>
+    <p:spTree>
+      <p:nvGrpSpPr>
+        <p:cNvPr id="1" name=""/>
+        <p:cNvGrpSpPr/>
+        <p:nvPr/>
+      </p:nvGrpSpPr>
+      <p:grpSpPr>
+        <a:xfrm>
+          <a:off x="0" y="0"/>
+          <a:ext cx="0" cy="0"/>
+          <a:chOff x="0" y="0"/>
+          <a:chExt cx="0" cy="0"/>
+        </a:xfrm>
+      </p:grpSpPr>
+      <p:sp>
+        <p:nvSpPr>
+          <p:cNvPr id="3" name="Title 2"/>
+          <p:cNvSpPr>
+            <a:spLocks noGrp="1"/>
+          </p:cNvSpPr>
+          <p:nvPr>
+            <p:ph type="title"/>
+          </p:nvPr>
+        </p:nvSpPr>
+        <p:spPr/>
+        <p:txBody>
+          <a:bodyPr/>
+          <a:lstStyle/>
+          <a:p>
+            <a:r>
+              <a:rPr lang="en-US" dirty="0"/>
+              <a:t>Verify </a:t>
+            </a:r>
+            <a:r>
+              <a:rPr lang="en-US" dirty="0" smtClean="0"/>
+              <a:t>Compliance Status </a:t>
+            </a:r>
+            <a:r>
+              <a:rPr lang="en-US" dirty="0"/>
+              <a:t>in Automate</a:t>
+            </a:r>
+          </a:p>
+        </p:txBody>
+      </p:sp>
+      <p:pic>
+        <p:nvPicPr>
+          <p:cNvPr id="5" name="Media Placeholder 4" descr="Chef_Automate.png"/>
+          <p:cNvPicPr>
+            <a:picLocks noGrp="1" noChangeAspect="1"/>
+          </p:cNvPicPr>
+          <p:nvPr>
+            <p:ph type="media" sz="quarter" idx="12"/>
+          </p:nvPr>
+        </p:nvPicPr>
+        <p:blipFill>
+          <a:blip r:embed="rId2">
+            <a:extLst>
+              <a:ext uri="{28A0092B-C50C-407E-A947-70E740481C1C}">
+                <a14:useLocalDpi xmlns:a14="http://schemas.microsoft.com/office/drawing/2010/main" val="0"/>
+              </a:ext>
+            </a:extLst>
+          </a:blip>
+          <a:srcRect l="1417" r="1417"/>
+          <a:stretch>
+            <a:fillRect/>
+          </a:stretch>
+        </p:blipFill>
+        <p:spPr/>
+      </p:pic>
+    </p:spTree>
+    <p:extLst>
+      <p:ext uri="{BB962C8B-B14F-4D97-AF65-F5344CB8AC3E}">
+        <p14:creationId xmlns:p14="http://schemas.microsoft.com/office/powerpoint/2010/main" val="3325247150"/>
       </p:ext>
     </p:extLst>
   </p:cSld>
@@ -13860,7 +15731,7 @@
   <a:extraClrSchemeLst/>
   <a:extLst>
     <a:ext uri="{05A4C25C-085E-4340-85A3-A5531E510DB2}">
-      <thm15:themeFamily xmlns:thm15="http://schemas.microsoft.com/office/thememl/2012/main" xmlns="" name="Chef-Template-16x9-Blue.potx" id="{AEDCA41E-F161-4EBB-B511-A8687687A8DC}" vid="{64ECDA82-38C2-4FAD-B0A3-D276970F43D1}"/>
+      <thm15:themeFamily xmlns="" xmlns:thm15="http://schemas.microsoft.com/office/thememl/2012/main" name="Chef-Template-16x9-Blue.potx" id="{AEDCA41E-F161-4EBB-B511-A8687687A8DC}" vid="{64ECDA82-38C2-4FAD-B0A3-D276970F43D1}"/>
     </a:ext>
   </a:extLst>
 </a:theme>
@@ -14256,7 +16127,7 @@
   <a:extraClrSchemeLst/>
   <a:extLst>
     <a:ext uri="{05A4C25C-085E-4340-85A3-A5531E510DB2}">
-      <thm15:themeFamily xmlns:thm15="http://schemas.microsoft.com/office/thememl/2012/main" xmlns="" name="Chef-Template-16x9-Blue.potx" id="{AEDCA41E-F161-4EBB-B511-A8687687A8DC}" vid="{64ECDA82-38C2-4FAD-B0A3-D276970F43D1}"/>
+      <thm15:themeFamily xmlns="" xmlns:thm15="http://schemas.microsoft.com/office/thememl/2012/main" name="Chef-Template-16x9-Blue.potx" id="{AEDCA41E-F161-4EBB-B511-A8687687A8DC}" vid="{64ECDA82-38C2-4FAD-B0A3-D276970F43D1}"/>
     </a:ext>
   </a:extLst>
 </a:theme>
@@ -14652,7 +16523,7 @@
   <a:extraClrSchemeLst/>
   <a:extLst>
     <a:ext uri="{05A4C25C-085E-4340-85A3-A5531E510DB2}">
-      <thm15:themeFamily xmlns:thm15="http://schemas.microsoft.com/office/thememl/2012/main" xmlns="" name="Chef-Template-16x9-Blue.potx" id="{AEDCA41E-F161-4EBB-B511-A8687687A8DC}" vid="{64ECDA82-38C2-4FAD-B0A3-D276970F43D1}"/>
+      <thm15:themeFamily xmlns="" xmlns:thm15="http://schemas.microsoft.com/office/thememl/2012/main" name="Chef-Template-16x9-Blue.potx" id="{AEDCA41E-F161-4EBB-B511-A8687687A8DC}" vid="{64ECDA82-38C2-4FAD-B0A3-D276970F43D1}"/>
     </a:ext>
   </a:extLst>
 </a:theme>

</xml_diff>